<commit_message>
+Commit complementaire: Avec le signal "mem_counter_address_readed" gestion de la lecture de la première donné presente en sortie de la dualRAM par défaut. +création d'un "start_pulse_pixel_shift" pour appliqué le Vp(energie) "Mem_Vp_shifte" sur le calcul au bon moment, pour l'instant en combinatoire. +premier résultat avec Vo variable et energie.
</commit_message>
<xml_diff>
--- a/tb_Pulse_generator/doc/Pixel adjacent décalés augmentés.pptx
+++ b/tb_Pulse_generator/doc/Pixel adjacent décalés augmentés.pptx
@@ -11,6 +11,12 @@
     <p:sldId id="259" r:id="rId5"/>
     <p:sldId id="260" r:id="rId6"/>
     <p:sldId id="261" r:id="rId7"/>
+    <p:sldId id="262" r:id="rId8"/>
+    <p:sldId id="263" r:id="rId9"/>
+    <p:sldId id="267" r:id="rId10"/>
+    <p:sldId id="264" r:id="rId11"/>
+    <p:sldId id="265" r:id="rId12"/>
+    <p:sldId id="266" r:id="rId13"/>
   </p:sldIdLst>
   <p:sldSz cx="12192000" cy="6858000"/>
   <p:notesSz cx="6858000" cy="9144000"/>
@@ -109,6 +115,11 @@
       </a:defRPr>
     </a:lvl9pPr>
   </p:defaultTextStyle>
+  <p:extLst>
+    <p:ext uri="{EFAFB233-063F-42B5-8137-9DF3F51BA10A}">
+      <p15:sldGuideLst xmlns:p15="http://schemas.microsoft.com/office/powerpoint/2012/main"/>
+    </p:ext>
+  </p:extLst>
 </p:presentation>
 </file>
 
@@ -243,7 +254,7 @@
           <a:p>
             <a:fld id="{E2CA2C1B-B3DD-48DC-A472-C749D3F3D906}" type="datetimeFigureOut">
               <a:rPr lang="fr-FR" smtClean="0"/>
-              <a:t>23/04/2020</a:t>
+              <a:t>28/04/2020</a:t>
             </a:fld>
             <a:endParaRPr lang="fr-FR"/>
           </a:p>
@@ -413,7 +424,7 @@
           <a:p>
             <a:fld id="{E2CA2C1B-B3DD-48DC-A472-C749D3F3D906}" type="datetimeFigureOut">
               <a:rPr lang="fr-FR" smtClean="0"/>
-              <a:t>23/04/2020</a:t>
+              <a:t>28/04/2020</a:t>
             </a:fld>
             <a:endParaRPr lang="fr-FR"/>
           </a:p>
@@ -593,7 +604,7 @@
           <a:p>
             <a:fld id="{E2CA2C1B-B3DD-48DC-A472-C749D3F3D906}" type="datetimeFigureOut">
               <a:rPr lang="fr-FR" smtClean="0"/>
-              <a:t>23/04/2020</a:t>
+              <a:t>28/04/2020</a:t>
             </a:fld>
             <a:endParaRPr lang="fr-FR"/>
           </a:p>
@@ -763,7 +774,7 @@
           <a:p>
             <a:fld id="{E2CA2C1B-B3DD-48DC-A472-C749D3F3D906}" type="datetimeFigureOut">
               <a:rPr lang="fr-FR" smtClean="0"/>
-              <a:t>23/04/2020</a:t>
+              <a:t>28/04/2020</a:t>
             </a:fld>
             <a:endParaRPr lang="fr-FR"/>
           </a:p>
@@ -1009,7 +1020,7 @@
           <a:p>
             <a:fld id="{E2CA2C1B-B3DD-48DC-A472-C749D3F3D906}" type="datetimeFigureOut">
               <a:rPr lang="fr-FR" smtClean="0"/>
-              <a:t>23/04/2020</a:t>
+              <a:t>28/04/2020</a:t>
             </a:fld>
             <a:endParaRPr lang="fr-FR"/>
           </a:p>
@@ -1241,7 +1252,7 @@
           <a:p>
             <a:fld id="{E2CA2C1B-B3DD-48DC-A472-C749D3F3D906}" type="datetimeFigureOut">
               <a:rPr lang="fr-FR" smtClean="0"/>
-              <a:t>23/04/2020</a:t>
+              <a:t>28/04/2020</a:t>
             </a:fld>
             <a:endParaRPr lang="fr-FR"/>
           </a:p>
@@ -1608,7 +1619,7 @@
           <a:p>
             <a:fld id="{E2CA2C1B-B3DD-48DC-A472-C749D3F3D906}" type="datetimeFigureOut">
               <a:rPr lang="fr-FR" smtClean="0"/>
-              <a:t>23/04/2020</a:t>
+              <a:t>28/04/2020</a:t>
             </a:fld>
             <a:endParaRPr lang="fr-FR"/>
           </a:p>
@@ -1726,7 +1737,7 @@
           <a:p>
             <a:fld id="{E2CA2C1B-B3DD-48DC-A472-C749D3F3D906}" type="datetimeFigureOut">
               <a:rPr lang="fr-FR" smtClean="0"/>
-              <a:t>23/04/2020</a:t>
+              <a:t>28/04/2020</a:t>
             </a:fld>
             <a:endParaRPr lang="fr-FR"/>
           </a:p>
@@ -1821,7 +1832,7 @@
           <a:p>
             <a:fld id="{E2CA2C1B-B3DD-48DC-A472-C749D3F3D906}" type="datetimeFigureOut">
               <a:rPr lang="fr-FR" smtClean="0"/>
-              <a:t>23/04/2020</a:t>
+              <a:t>28/04/2020</a:t>
             </a:fld>
             <a:endParaRPr lang="fr-FR"/>
           </a:p>
@@ -2098,7 +2109,7 @@
           <a:p>
             <a:fld id="{E2CA2C1B-B3DD-48DC-A472-C749D3F3D906}" type="datetimeFigureOut">
               <a:rPr lang="fr-FR" smtClean="0"/>
-              <a:t>23/04/2020</a:t>
+              <a:t>28/04/2020</a:t>
             </a:fld>
             <a:endParaRPr lang="fr-FR"/>
           </a:p>
@@ -2351,7 +2362,7 @@
           <a:p>
             <a:fld id="{E2CA2C1B-B3DD-48DC-A472-C749D3F3D906}" type="datetimeFigureOut">
               <a:rPr lang="fr-FR" smtClean="0"/>
-              <a:t>23/04/2020</a:t>
+              <a:t>28/04/2020</a:t>
             </a:fld>
             <a:endParaRPr lang="fr-FR"/>
           </a:p>
@@ -2564,7 +2575,7 @@
           <a:p>
             <a:fld id="{E2CA2C1B-B3DD-48DC-A472-C749D3F3D906}" type="datetimeFigureOut">
               <a:rPr lang="fr-FR" smtClean="0"/>
-              <a:t>23/04/2020</a:t>
+              <a:t>28/04/2020</a:t>
             </a:fld>
             <a:endParaRPr lang="fr-FR"/>
           </a:p>
@@ -3019,6 +3030,245 @@
 </p:sld>
 </file>
 
+<file path=ppt/slides/slide10.xml><?xml version="1.0" encoding="utf-8"?>
+<p:sld xmlns:a="http://schemas.openxmlformats.org/drawingml/2006/main" xmlns:r="http://schemas.openxmlformats.org/officeDocument/2006/relationships" xmlns:p="http://schemas.openxmlformats.org/presentationml/2006/main">
+  <p:cSld>
+    <p:spTree>
+      <p:nvGrpSpPr>
+        <p:cNvPr id="1" name=""/>
+        <p:cNvGrpSpPr/>
+        <p:nvPr/>
+      </p:nvGrpSpPr>
+      <p:grpSpPr>
+        <a:xfrm>
+          <a:off x="0" y="0"/>
+          <a:ext cx="0" cy="0"/>
+          <a:chOff x="0" y="0"/>
+          <a:chExt cx="0" cy="0"/>
+        </a:xfrm>
+      </p:grpSpPr>
+      <p:sp>
+        <p:nvSpPr>
+          <p:cNvPr id="2" name="Titre 1"/>
+          <p:cNvSpPr>
+            <a:spLocks noGrp="1"/>
+          </p:cNvSpPr>
+          <p:nvPr>
+            <p:ph type="title"/>
+          </p:nvPr>
+        </p:nvSpPr>
+        <p:spPr/>
+        <p:txBody>
+          <a:bodyPr/>
+          <a:lstStyle/>
+          <a:p>
+            <a:r>
+              <a:rPr lang="fr-FR" dirty="0" smtClean="0"/>
+              <a:t>Début de l’activation </a:t>
+            </a:r>
+            <a:r>
+              <a:rPr lang="fr-FR" dirty="0" smtClean="0"/>
+              <a:t>de tout les pixels.</a:t>
+            </a:r>
+            <a:endParaRPr lang="fr-FR" dirty="0"/>
+          </a:p>
+        </p:txBody>
+      </p:sp>
+      <p:pic>
+        <p:nvPicPr>
+          <p:cNvPr id="4" name="Image 3"/>
+          <p:cNvPicPr>
+            <a:picLocks noChangeAspect="1"/>
+          </p:cNvPicPr>
+          <p:nvPr/>
+        </p:nvPicPr>
+        <p:blipFill>
+          <a:blip r:embed="rId2"/>
+          <a:stretch>
+            <a:fillRect/>
+          </a:stretch>
+        </p:blipFill>
+        <p:spPr>
+          <a:xfrm>
+            <a:off x="838200" y="1329344"/>
+            <a:ext cx="10915996" cy="5183574"/>
+          </a:xfrm>
+          <a:prstGeom prst="rect">
+            <a:avLst/>
+          </a:prstGeom>
+        </p:spPr>
+      </p:pic>
+    </p:spTree>
+    <p:extLst>
+      <p:ext uri="{BB962C8B-B14F-4D97-AF65-F5344CB8AC3E}">
+        <p14:creationId xmlns:p14="http://schemas.microsoft.com/office/powerpoint/2010/main" val="3187587369"/>
+      </p:ext>
+    </p:extLst>
+  </p:cSld>
+  <p:clrMapOvr>
+    <a:masterClrMapping/>
+  </p:clrMapOvr>
+</p:sld>
+</file>
+
+<file path=ppt/slides/slide11.xml><?xml version="1.0" encoding="utf-8"?>
+<p:sld xmlns:a="http://schemas.openxmlformats.org/drawingml/2006/main" xmlns:r="http://schemas.openxmlformats.org/officeDocument/2006/relationships" xmlns:p="http://schemas.openxmlformats.org/presentationml/2006/main">
+  <p:cSld>
+    <p:spTree>
+      <p:nvGrpSpPr>
+        <p:cNvPr id="1" name=""/>
+        <p:cNvGrpSpPr/>
+        <p:nvPr/>
+      </p:nvGrpSpPr>
+      <p:grpSpPr>
+        <a:xfrm>
+          <a:off x="0" y="0"/>
+          <a:ext cx="0" cy="0"/>
+          <a:chOff x="0" y="0"/>
+          <a:chExt cx="0" cy="0"/>
+        </a:xfrm>
+      </p:grpSpPr>
+      <p:sp>
+        <p:nvSpPr>
+          <p:cNvPr id="2" name="Titre 1"/>
+          <p:cNvSpPr>
+            <a:spLocks noGrp="1"/>
+          </p:cNvSpPr>
+          <p:nvPr>
+            <p:ph type="title"/>
+          </p:nvPr>
+        </p:nvSpPr>
+        <p:spPr/>
+        <p:txBody>
+          <a:bodyPr/>
+          <a:lstStyle/>
+          <a:p>
+            <a:r>
+              <a:rPr lang="fr-FR" dirty="0" smtClean="0"/>
+              <a:t>Début de l’activation des </a:t>
+            </a:r>
+            <a:r>
+              <a:rPr lang="fr-FR" dirty="0" smtClean="0"/>
+              <a:t>pixels impaire.</a:t>
+            </a:r>
+            <a:endParaRPr lang="fr-FR" dirty="0"/>
+          </a:p>
+        </p:txBody>
+      </p:sp>
+      <p:pic>
+        <p:nvPicPr>
+          <p:cNvPr id="4" name="Image 3"/>
+          <p:cNvPicPr>
+            <a:picLocks noChangeAspect="1"/>
+          </p:cNvPicPr>
+          <p:nvPr/>
+        </p:nvPicPr>
+        <p:blipFill>
+          <a:blip r:embed="rId2"/>
+          <a:stretch>
+            <a:fillRect/>
+          </a:stretch>
+        </p:blipFill>
+        <p:spPr>
+          <a:xfrm>
+            <a:off x="838200" y="1333500"/>
+            <a:ext cx="10961073" cy="5208616"/>
+          </a:xfrm>
+          <a:prstGeom prst="rect">
+            <a:avLst/>
+          </a:prstGeom>
+        </p:spPr>
+      </p:pic>
+    </p:spTree>
+    <p:extLst>
+      <p:ext uri="{BB962C8B-B14F-4D97-AF65-F5344CB8AC3E}">
+        <p14:creationId xmlns:p14="http://schemas.microsoft.com/office/powerpoint/2010/main" val="1304696486"/>
+      </p:ext>
+    </p:extLst>
+  </p:cSld>
+  <p:clrMapOvr>
+    <a:masterClrMapping/>
+  </p:clrMapOvr>
+</p:sld>
+</file>
+
+<file path=ppt/slides/slide12.xml><?xml version="1.0" encoding="utf-8"?>
+<p:sld xmlns:a="http://schemas.openxmlformats.org/drawingml/2006/main" xmlns:r="http://schemas.openxmlformats.org/officeDocument/2006/relationships" xmlns:p="http://schemas.openxmlformats.org/presentationml/2006/main">
+  <p:cSld>
+    <p:spTree>
+      <p:nvGrpSpPr>
+        <p:cNvPr id="1" name=""/>
+        <p:cNvGrpSpPr/>
+        <p:nvPr/>
+      </p:nvGrpSpPr>
+      <p:grpSpPr>
+        <a:xfrm>
+          <a:off x="0" y="0"/>
+          <a:ext cx="0" cy="0"/>
+          <a:chOff x="0" y="0"/>
+          <a:chExt cx="0" cy="0"/>
+        </a:xfrm>
+      </p:grpSpPr>
+      <p:sp>
+        <p:nvSpPr>
+          <p:cNvPr id="2" name="Titre 1"/>
+          <p:cNvSpPr>
+            <a:spLocks noGrp="1"/>
+          </p:cNvSpPr>
+          <p:nvPr>
+            <p:ph type="title"/>
+          </p:nvPr>
+        </p:nvSpPr>
+        <p:spPr/>
+        <p:txBody>
+          <a:bodyPr/>
+          <a:lstStyle/>
+          <a:p>
+            <a:r>
+              <a:rPr lang="fr-FR" dirty="0"/>
+              <a:t>Début de l’activation des pixels impaire</a:t>
+            </a:r>
+            <a:endParaRPr lang="fr-FR" dirty="0"/>
+          </a:p>
+        </p:txBody>
+      </p:sp>
+      <p:pic>
+        <p:nvPicPr>
+          <p:cNvPr id="4" name="Image 3"/>
+          <p:cNvPicPr>
+            <a:picLocks noChangeAspect="1"/>
+          </p:cNvPicPr>
+          <p:nvPr/>
+        </p:nvPicPr>
+        <p:blipFill>
+          <a:blip r:embed="rId2"/>
+          <a:stretch>
+            <a:fillRect/>
+          </a:stretch>
+        </p:blipFill>
+        <p:spPr>
+          <a:xfrm>
+            <a:off x="838200" y="2624407"/>
+            <a:ext cx="10114742" cy="1967544"/>
+          </a:xfrm>
+          <a:prstGeom prst="rect">
+            <a:avLst/>
+          </a:prstGeom>
+        </p:spPr>
+      </p:pic>
+    </p:spTree>
+    <p:extLst>
+      <p:ext uri="{BB962C8B-B14F-4D97-AF65-F5344CB8AC3E}">
+        <p14:creationId xmlns:p14="http://schemas.microsoft.com/office/powerpoint/2010/main" val="997819116"/>
+      </p:ext>
+    </p:extLst>
+  </p:cSld>
+  <p:clrMapOvr>
+    <a:masterClrMapping/>
+  </p:clrMapOvr>
+</p:sld>
+</file>
+
 <file path=ppt/slides/slide2.xml><?xml version="1.0" encoding="utf-8"?>
 <p:sld xmlns:a="http://schemas.openxmlformats.org/drawingml/2006/main" xmlns:r="http://schemas.openxmlformats.org/officeDocument/2006/relationships" xmlns:p="http://schemas.openxmlformats.org/presentationml/2006/main">
   <p:cSld>
@@ -3368,7 +3618,92 @@
           <a:p>
             <a:r>
               <a:rPr lang="fr-FR" dirty="0" smtClean="0"/>
-              <a:t>Zoom sur les derniers pixel (avec un max. sur le premier point RAM du pulse) qui indique le début du pulse et le début de V0!</a:t>
+              <a:t>Zoom sur un pixel(avec un max. sur le premier point RAM pulse et dernier </a:t>
+            </a:r>
+            <a:r>
+              <a:rPr lang="fr-FR" smtClean="0"/>
+              <a:t>point RAM pulse) </a:t>
+            </a:r>
+            <a:r>
+              <a:rPr lang="fr-FR" dirty="0" smtClean="0"/>
+              <a:t>qui indique le début du pulse et la fin du pulse,  delta de(1024*34*200ns=6.963.200ns)!</a:t>
+            </a:r>
+            <a:endParaRPr lang="fr-FR" dirty="0"/>
+          </a:p>
+        </p:txBody>
+      </p:sp>
+      <p:pic>
+        <p:nvPicPr>
+          <p:cNvPr id="5" name="Image 4"/>
+          <p:cNvPicPr>
+            <a:picLocks noChangeAspect="1"/>
+          </p:cNvPicPr>
+          <p:nvPr/>
+        </p:nvPicPr>
+        <p:blipFill>
+          <a:blip r:embed="rId2"/>
+          <a:stretch>
+            <a:fillRect/>
+          </a:stretch>
+        </p:blipFill>
+        <p:spPr>
+          <a:xfrm>
+            <a:off x="838200" y="2063220"/>
+            <a:ext cx="9761007" cy="4649715"/>
+          </a:xfrm>
+          <a:prstGeom prst="rect">
+            <a:avLst/>
+          </a:prstGeom>
+        </p:spPr>
+      </p:pic>
+    </p:spTree>
+    <p:extLst>
+      <p:ext uri="{BB962C8B-B14F-4D97-AF65-F5344CB8AC3E}">
+        <p14:creationId xmlns:p14="http://schemas.microsoft.com/office/powerpoint/2010/main" val="2221593686"/>
+      </p:ext>
+    </p:extLst>
+  </p:cSld>
+  <p:clrMapOvr>
+    <a:masterClrMapping/>
+  </p:clrMapOvr>
+</p:sld>
+</file>
+
+<file path=ppt/slides/slide7.xml><?xml version="1.0" encoding="utf-8"?>
+<p:sld xmlns:a="http://schemas.openxmlformats.org/drawingml/2006/main" xmlns:r="http://schemas.openxmlformats.org/officeDocument/2006/relationships" xmlns:p="http://schemas.openxmlformats.org/presentationml/2006/main">
+  <p:cSld>
+    <p:spTree>
+      <p:nvGrpSpPr>
+        <p:cNvPr id="1" name=""/>
+        <p:cNvGrpSpPr/>
+        <p:nvPr/>
+      </p:nvGrpSpPr>
+      <p:grpSpPr>
+        <a:xfrm>
+          <a:off x="0" y="0"/>
+          <a:ext cx="0" cy="0"/>
+          <a:chOff x="0" y="0"/>
+          <a:chExt cx="0" cy="0"/>
+        </a:xfrm>
+      </p:grpSpPr>
+      <p:sp>
+        <p:nvSpPr>
+          <p:cNvPr id="2" name="Titre 1"/>
+          <p:cNvSpPr>
+            <a:spLocks noGrp="1"/>
+          </p:cNvSpPr>
+          <p:nvPr>
+            <p:ph type="title"/>
+          </p:nvPr>
+        </p:nvSpPr>
+        <p:spPr/>
+        <p:txBody>
+          <a:bodyPr/>
+          <a:lstStyle/>
+          <a:p>
+            <a:r>
+              <a:rPr lang="fr-FR" dirty="0" smtClean="0"/>
+              <a:t>Rampe de V0 ultra rapide (pas de perte de V0) </a:t>
             </a:r>
             <a:endParaRPr lang="fr-FR" dirty="0"/>
           </a:p>
@@ -3390,8 +3725,8 @@
         </p:blipFill>
         <p:spPr>
           <a:xfrm>
-            <a:off x="838200" y="1867853"/>
-            <a:ext cx="9559396" cy="4876426"/>
+            <a:off x="948795" y="1521353"/>
+            <a:ext cx="10083271" cy="4826723"/>
           </a:xfrm>
           <a:prstGeom prst="rect">
             <a:avLst/>
@@ -3401,7 +3736,169 @@
     </p:spTree>
     <p:extLst>
       <p:ext uri="{BB962C8B-B14F-4D97-AF65-F5344CB8AC3E}">
-        <p14:creationId xmlns:p14="http://schemas.microsoft.com/office/powerpoint/2010/main" val="2221593686"/>
+        <p14:creationId xmlns:p14="http://schemas.microsoft.com/office/powerpoint/2010/main" val="3749331094"/>
+      </p:ext>
+    </p:extLst>
+  </p:cSld>
+  <p:clrMapOvr>
+    <a:masterClrMapping/>
+  </p:clrMapOvr>
+</p:sld>
+</file>
+
+<file path=ppt/slides/slide8.xml><?xml version="1.0" encoding="utf-8"?>
+<p:sld xmlns:a="http://schemas.openxmlformats.org/drawingml/2006/main" xmlns:r="http://schemas.openxmlformats.org/officeDocument/2006/relationships" xmlns:p="http://schemas.openxmlformats.org/presentationml/2006/main">
+  <p:cSld>
+    <p:spTree>
+      <p:nvGrpSpPr>
+        <p:cNvPr id="1" name=""/>
+        <p:cNvGrpSpPr/>
+        <p:nvPr/>
+      </p:nvGrpSpPr>
+      <p:grpSpPr>
+        <a:xfrm>
+          <a:off x="0" y="0"/>
+          <a:ext cx="0" cy="0"/>
+          <a:chOff x="0" y="0"/>
+          <a:chExt cx="0" cy="0"/>
+        </a:xfrm>
+      </p:grpSpPr>
+      <p:sp>
+        <p:nvSpPr>
+          <p:cNvPr id="2" name="Titre 1"/>
+          <p:cNvSpPr>
+            <a:spLocks noGrp="1"/>
+          </p:cNvSpPr>
+          <p:nvPr>
+            <p:ph type="title"/>
+          </p:nvPr>
+        </p:nvSpPr>
+        <p:spPr/>
+        <p:txBody>
+          <a:bodyPr/>
+          <a:lstStyle/>
+          <a:p>
+            <a:r>
+              <a:rPr lang="fr-FR" dirty="0" smtClean="0"/>
+              <a:t>Début de l’activation des </a:t>
+            </a:r>
+            <a:r>
+              <a:rPr lang="fr-FR" dirty="0" smtClean="0"/>
+              <a:t>pixels paire.</a:t>
+            </a:r>
+            <a:endParaRPr lang="fr-FR" dirty="0"/>
+          </a:p>
+        </p:txBody>
+      </p:sp>
+      <p:pic>
+        <p:nvPicPr>
+          <p:cNvPr id="4" name="Image 3"/>
+          <p:cNvPicPr>
+            <a:picLocks noChangeAspect="1"/>
+          </p:cNvPicPr>
+          <p:nvPr/>
+        </p:nvPicPr>
+        <p:blipFill>
+          <a:blip r:embed="rId2"/>
+          <a:stretch>
+            <a:fillRect/>
+          </a:stretch>
+        </p:blipFill>
+        <p:spPr>
+          <a:xfrm>
+            <a:off x="957263" y="1484841"/>
+            <a:ext cx="9727671" cy="4636109"/>
+          </a:xfrm>
+          <a:prstGeom prst="rect">
+            <a:avLst/>
+          </a:prstGeom>
+        </p:spPr>
+      </p:pic>
+    </p:spTree>
+    <p:extLst>
+      <p:ext uri="{BB962C8B-B14F-4D97-AF65-F5344CB8AC3E}">
+        <p14:creationId xmlns:p14="http://schemas.microsoft.com/office/powerpoint/2010/main" val="4055367493"/>
+      </p:ext>
+    </p:extLst>
+  </p:cSld>
+  <p:clrMapOvr>
+    <a:masterClrMapping/>
+  </p:clrMapOvr>
+</p:sld>
+</file>
+
+<file path=ppt/slides/slide9.xml><?xml version="1.0" encoding="utf-8"?>
+<p:sld xmlns:a="http://schemas.openxmlformats.org/drawingml/2006/main" xmlns:r="http://schemas.openxmlformats.org/officeDocument/2006/relationships" xmlns:p="http://schemas.openxmlformats.org/presentationml/2006/main">
+  <p:cSld>
+    <p:spTree>
+      <p:nvGrpSpPr>
+        <p:cNvPr id="1" name=""/>
+        <p:cNvGrpSpPr/>
+        <p:nvPr/>
+      </p:nvGrpSpPr>
+      <p:grpSpPr>
+        <a:xfrm>
+          <a:off x="0" y="0"/>
+          <a:ext cx="0" cy="0"/>
+          <a:chOff x="0" y="0"/>
+          <a:chExt cx="0" cy="0"/>
+        </a:xfrm>
+      </p:grpSpPr>
+      <p:sp>
+        <p:nvSpPr>
+          <p:cNvPr id="4" name="Titre 1"/>
+          <p:cNvSpPr>
+            <a:spLocks noGrp="1"/>
+          </p:cNvSpPr>
+          <p:nvPr>
+            <p:ph type="title"/>
+          </p:nvPr>
+        </p:nvSpPr>
+        <p:spPr/>
+        <p:txBody>
+          <a:bodyPr/>
+          <a:lstStyle/>
+          <a:p>
+            <a:r>
+              <a:rPr lang="fr-FR" dirty="0" smtClean="0"/>
+              <a:t>Début de l’activation des </a:t>
+            </a:r>
+            <a:r>
+              <a:rPr lang="fr-FR" dirty="0" smtClean="0"/>
+              <a:t>pixels paire.</a:t>
+            </a:r>
+            <a:endParaRPr lang="fr-FR" dirty="0"/>
+          </a:p>
+        </p:txBody>
+      </p:sp>
+      <p:pic>
+        <p:nvPicPr>
+          <p:cNvPr id="5" name="Image 4"/>
+          <p:cNvPicPr>
+            <a:picLocks noChangeAspect="1"/>
+          </p:cNvPicPr>
+          <p:nvPr/>
+        </p:nvPicPr>
+        <p:blipFill>
+          <a:blip r:embed="rId2"/>
+          <a:stretch>
+            <a:fillRect/>
+          </a:stretch>
+        </p:blipFill>
+        <p:spPr>
+          <a:xfrm>
+            <a:off x="838200" y="2392372"/>
+            <a:ext cx="8862965" cy="1600084"/>
+          </a:xfrm>
+          <a:prstGeom prst="rect">
+            <a:avLst/>
+          </a:prstGeom>
+        </p:spPr>
+      </p:pic>
+    </p:spTree>
+    <p:extLst>
+      <p:ext uri="{BB962C8B-B14F-4D97-AF65-F5344CB8AC3E}">
+        <p14:creationId xmlns:p14="http://schemas.microsoft.com/office/powerpoint/2010/main" val="4177234419"/>
       </p:ext>
     </p:extLst>
   </p:cSld>

</xml_diff>

<commit_message>
+Le signal "Mem_Vp_shifte" sur le calcul au bon moment est maintenant "processer" cadencé sur pixel_delayed_3, avant en combinatoire cadencé sur pixel_delayed_. +de meme pour start_pulse_pixel_shift cadencé sur pixel_delayed_3.
</commit_message>
<xml_diff>
--- a/tb_Pulse_generator/doc/Pixel adjacent décalés augmentés.pptx
+++ b/tb_Pulse_generator/doc/Pixel adjacent décalés augmentés.pptx
@@ -11,12 +11,13 @@
     <p:sldId id="259" r:id="rId5"/>
     <p:sldId id="260" r:id="rId6"/>
     <p:sldId id="261" r:id="rId7"/>
-    <p:sldId id="262" r:id="rId8"/>
-    <p:sldId id="263" r:id="rId9"/>
-    <p:sldId id="267" r:id="rId10"/>
-    <p:sldId id="264" r:id="rId11"/>
-    <p:sldId id="265" r:id="rId12"/>
-    <p:sldId id="266" r:id="rId13"/>
+    <p:sldId id="268" r:id="rId8"/>
+    <p:sldId id="262" r:id="rId9"/>
+    <p:sldId id="263" r:id="rId10"/>
+    <p:sldId id="267" r:id="rId11"/>
+    <p:sldId id="264" r:id="rId12"/>
+    <p:sldId id="265" r:id="rId13"/>
+    <p:sldId id="266" r:id="rId14"/>
   </p:sldIdLst>
   <p:sldSz cx="12192000" cy="6858000"/>
   <p:notesSz cx="6858000" cy="9144000"/>
@@ -3049,6 +3050,83 @@
       </p:grpSpPr>
       <p:sp>
         <p:nvSpPr>
+          <p:cNvPr id="4" name="Titre 1"/>
+          <p:cNvSpPr>
+            <a:spLocks noGrp="1"/>
+          </p:cNvSpPr>
+          <p:nvPr>
+            <p:ph type="title"/>
+          </p:nvPr>
+        </p:nvSpPr>
+        <p:spPr/>
+        <p:txBody>
+          <a:bodyPr/>
+          <a:lstStyle/>
+          <a:p>
+            <a:r>
+              <a:rPr lang="fr-FR" dirty="0" smtClean="0"/>
+              <a:t>Début de l’activation des pixels paire.</a:t>
+            </a:r>
+            <a:endParaRPr lang="fr-FR" dirty="0"/>
+          </a:p>
+        </p:txBody>
+      </p:sp>
+      <p:pic>
+        <p:nvPicPr>
+          <p:cNvPr id="5" name="Image 4"/>
+          <p:cNvPicPr>
+            <a:picLocks noChangeAspect="1"/>
+          </p:cNvPicPr>
+          <p:nvPr/>
+        </p:nvPicPr>
+        <p:blipFill>
+          <a:blip r:embed="rId2"/>
+          <a:stretch>
+            <a:fillRect/>
+          </a:stretch>
+        </p:blipFill>
+        <p:spPr>
+          <a:xfrm>
+            <a:off x="838200" y="2392372"/>
+            <a:ext cx="8862965" cy="1600084"/>
+          </a:xfrm>
+          <a:prstGeom prst="rect">
+            <a:avLst/>
+          </a:prstGeom>
+        </p:spPr>
+      </p:pic>
+    </p:spTree>
+    <p:extLst>
+      <p:ext uri="{BB962C8B-B14F-4D97-AF65-F5344CB8AC3E}">
+        <p14:creationId xmlns:p14="http://schemas.microsoft.com/office/powerpoint/2010/main" val="4177234419"/>
+      </p:ext>
+    </p:extLst>
+  </p:cSld>
+  <p:clrMapOvr>
+    <a:masterClrMapping/>
+  </p:clrMapOvr>
+</p:sld>
+</file>
+
+<file path=ppt/slides/slide11.xml><?xml version="1.0" encoding="utf-8"?>
+<p:sld xmlns:a="http://schemas.openxmlformats.org/drawingml/2006/main" xmlns:r="http://schemas.openxmlformats.org/officeDocument/2006/relationships" xmlns:p="http://schemas.openxmlformats.org/presentationml/2006/main">
+  <p:cSld>
+    <p:spTree>
+      <p:nvGrpSpPr>
+        <p:cNvPr id="1" name=""/>
+        <p:cNvGrpSpPr/>
+        <p:nvPr/>
+      </p:nvGrpSpPr>
+      <p:grpSpPr>
+        <a:xfrm>
+          <a:off x="0" y="0"/>
+          <a:ext cx="0" cy="0"/>
+          <a:chOff x="0" y="0"/>
+          <a:chExt cx="0" cy="0"/>
+        </a:xfrm>
+      </p:grpSpPr>
+      <p:sp>
+        <p:nvSpPr>
           <p:cNvPr id="2" name="Titre 1"/>
           <p:cNvSpPr>
             <a:spLocks noGrp="1"/>
@@ -3064,11 +3142,7 @@
           <a:p>
             <a:r>
               <a:rPr lang="fr-FR" dirty="0" smtClean="0"/>
-              <a:t>Début de l’activation </a:t>
-            </a:r>
-            <a:r>
-              <a:rPr lang="fr-FR" dirty="0" smtClean="0"/>
-              <a:t>de tout les pixels.</a:t>
+              <a:t>Début de l’activation de tout les pixels.</a:t>
             </a:r>
             <a:endParaRPr lang="fr-FR" dirty="0"/>
           </a:p>
@@ -3111,7 +3185,7 @@
 </p:sld>
 </file>
 
-<file path=ppt/slides/slide11.xml><?xml version="1.0" encoding="utf-8"?>
+<file path=ppt/slides/slide12.xml><?xml version="1.0" encoding="utf-8"?>
 <p:sld xmlns:a="http://schemas.openxmlformats.org/drawingml/2006/main" xmlns:r="http://schemas.openxmlformats.org/officeDocument/2006/relationships" xmlns:p="http://schemas.openxmlformats.org/presentationml/2006/main">
   <p:cSld>
     <p:spTree>
@@ -3145,11 +3219,7 @@
           <a:p>
             <a:r>
               <a:rPr lang="fr-FR" dirty="0" smtClean="0"/>
-              <a:t>Début de l’activation des </a:t>
-            </a:r>
-            <a:r>
-              <a:rPr lang="fr-FR" dirty="0" smtClean="0"/>
-              <a:t>pixels impaire.</a:t>
+              <a:t>Début de l’activation des pixels impaire.</a:t>
             </a:r>
             <a:endParaRPr lang="fr-FR" dirty="0"/>
           </a:p>
@@ -3192,7 +3262,7 @@
 </p:sld>
 </file>
 
-<file path=ppt/slides/slide12.xml><?xml version="1.0" encoding="utf-8"?>
+<file path=ppt/slides/slide13.xml><?xml version="1.0" encoding="utf-8"?>
 <p:sld xmlns:a="http://schemas.openxmlformats.org/drawingml/2006/main" xmlns:r="http://schemas.openxmlformats.org/officeDocument/2006/relationships" xmlns:p="http://schemas.openxmlformats.org/presentationml/2006/main">
   <p:cSld>
     <p:spTree>
@@ -3228,7 +3298,6 @@
               <a:rPr lang="fr-FR" dirty="0"/>
               <a:t>Début de l’activation des pixels impaire</a:t>
             </a:r>
-            <a:endParaRPr lang="fr-FR" dirty="0"/>
           </a:p>
         </p:txBody>
       </p:sp>
@@ -3698,6 +3767,89 @@
         </p:nvSpPr>
         <p:spPr/>
         <p:txBody>
+          <a:bodyPr>
+            <a:normAutofit fontScale="90000"/>
+          </a:bodyPr>
+          <a:lstStyle/>
+          <a:p>
+            <a:r>
+              <a:rPr lang="fr-FR" smtClean="0"/>
+              <a:t>Imperfection? </a:t>
+            </a:r>
+            <a:r>
+              <a:rPr lang="fr-FR" dirty="0" smtClean="0"/>
+              <a:t>décalage de 6,8us soit (34*200ns) entre le Vo et le premier point de l’Energie.</a:t>
+            </a:r>
+            <a:endParaRPr lang="fr-FR" dirty="0"/>
+          </a:p>
+        </p:txBody>
+      </p:sp>
+      <p:pic>
+        <p:nvPicPr>
+          <p:cNvPr id="4" name="Image 3"/>
+          <p:cNvPicPr>
+            <a:picLocks noChangeAspect="1"/>
+          </p:cNvPicPr>
+          <p:nvPr/>
+        </p:nvPicPr>
+        <p:blipFill>
+          <a:blip r:embed="rId2"/>
+          <a:stretch>
+            <a:fillRect/>
+          </a:stretch>
+        </p:blipFill>
+        <p:spPr>
+          <a:xfrm>
+            <a:off x="838200" y="2761719"/>
+            <a:ext cx="9955213" cy="1483877"/>
+          </a:xfrm>
+          <a:prstGeom prst="rect">
+            <a:avLst/>
+          </a:prstGeom>
+        </p:spPr>
+      </p:pic>
+    </p:spTree>
+    <p:extLst>
+      <p:ext uri="{BB962C8B-B14F-4D97-AF65-F5344CB8AC3E}">
+        <p14:creationId xmlns:p14="http://schemas.microsoft.com/office/powerpoint/2010/main" val="831963327"/>
+      </p:ext>
+    </p:extLst>
+  </p:cSld>
+  <p:clrMapOvr>
+    <a:masterClrMapping/>
+  </p:clrMapOvr>
+</p:sld>
+</file>
+
+<file path=ppt/slides/slide8.xml><?xml version="1.0" encoding="utf-8"?>
+<p:sld xmlns:a="http://schemas.openxmlformats.org/drawingml/2006/main" xmlns:r="http://schemas.openxmlformats.org/officeDocument/2006/relationships" xmlns:p="http://schemas.openxmlformats.org/presentationml/2006/main">
+  <p:cSld>
+    <p:spTree>
+      <p:nvGrpSpPr>
+        <p:cNvPr id="1" name=""/>
+        <p:cNvGrpSpPr/>
+        <p:nvPr/>
+      </p:nvGrpSpPr>
+      <p:grpSpPr>
+        <a:xfrm>
+          <a:off x="0" y="0"/>
+          <a:ext cx="0" cy="0"/>
+          <a:chOff x="0" y="0"/>
+          <a:chExt cx="0" cy="0"/>
+        </a:xfrm>
+      </p:grpSpPr>
+      <p:sp>
+        <p:nvSpPr>
+          <p:cNvPr id="2" name="Titre 1"/>
+          <p:cNvSpPr>
+            <a:spLocks noGrp="1"/>
+          </p:cNvSpPr>
+          <p:nvPr>
+            <p:ph type="title"/>
+          </p:nvPr>
+        </p:nvSpPr>
+        <p:spPr/>
+        <p:txBody>
           <a:bodyPr/>
           <a:lstStyle/>
           <a:p>
@@ -3746,7 +3898,7 @@
 </p:sld>
 </file>
 
-<file path=ppt/slides/slide8.xml><?xml version="1.0" encoding="utf-8"?>
+<file path=ppt/slides/slide9.xml><?xml version="1.0" encoding="utf-8"?>
 <p:sld xmlns:a="http://schemas.openxmlformats.org/drawingml/2006/main" xmlns:r="http://schemas.openxmlformats.org/officeDocument/2006/relationships" xmlns:p="http://schemas.openxmlformats.org/presentationml/2006/main">
   <p:cSld>
     <p:spTree>
@@ -3780,11 +3932,7 @@
           <a:p>
             <a:r>
               <a:rPr lang="fr-FR" dirty="0" smtClean="0"/>
-              <a:t>Début de l’activation des </a:t>
-            </a:r>
-            <a:r>
-              <a:rPr lang="fr-FR" dirty="0" smtClean="0"/>
-              <a:t>pixels paire.</a:t>
+              <a:t>Début de l’activation des pixels paire.</a:t>
             </a:r>
             <a:endParaRPr lang="fr-FR" dirty="0"/>
           </a:p>
@@ -3818,87 +3966,6 @@
     <p:extLst>
       <p:ext uri="{BB962C8B-B14F-4D97-AF65-F5344CB8AC3E}">
         <p14:creationId xmlns:p14="http://schemas.microsoft.com/office/powerpoint/2010/main" val="4055367493"/>
-      </p:ext>
-    </p:extLst>
-  </p:cSld>
-  <p:clrMapOvr>
-    <a:masterClrMapping/>
-  </p:clrMapOvr>
-</p:sld>
-</file>
-
-<file path=ppt/slides/slide9.xml><?xml version="1.0" encoding="utf-8"?>
-<p:sld xmlns:a="http://schemas.openxmlformats.org/drawingml/2006/main" xmlns:r="http://schemas.openxmlformats.org/officeDocument/2006/relationships" xmlns:p="http://schemas.openxmlformats.org/presentationml/2006/main">
-  <p:cSld>
-    <p:spTree>
-      <p:nvGrpSpPr>
-        <p:cNvPr id="1" name=""/>
-        <p:cNvGrpSpPr/>
-        <p:nvPr/>
-      </p:nvGrpSpPr>
-      <p:grpSpPr>
-        <a:xfrm>
-          <a:off x="0" y="0"/>
-          <a:ext cx="0" cy="0"/>
-          <a:chOff x="0" y="0"/>
-          <a:chExt cx="0" cy="0"/>
-        </a:xfrm>
-      </p:grpSpPr>
-      <p:sp>
-        <p:nvSpPr>
-          <p:cNvPr id="4" name="Titre 1"/>
-          <p:cNvSpPr>
-            <a:spLocks noGrp="1"/>
-          </p:cNvSpPr>
-          <p:nvPr>
-            <p:ph type="title"/>
-          </p:nvPr>
-        </p:nvSpPr>
-        <p:spPr/>
-        <p:txBody>
-          <a:bodyPr/>
-          <a:lstStyle/>
-          <a:p>
-            <a:r>
-              <a:rPr lang="fr-FR" dirty="0" smtClean="0"/>
-              <a:t>Début de l’activation des </a:t>
-            </a:r>
-            <a:r>
-              <a:rPr lang="fr-FR" dirty="0" smtClean="0"/>
-              <a:t>pixels paire.</a:t>
-            </a:r>
-            <a:endParaRPr lang="fr-FR" dirty="0"/>
-          </a:p>
-        </p:txBody>
-      </p:sp>
-      <p:pic>
-        <p:nvPicPr>
-          <p:cNvPr id="5" name="Image 4"/>
-          <p:cNvPicPr>
-            <a:picLocks noChangeAspect="1"/>
-          </p:cNvPicPr>
-          <p:nvPr/>
-        </p:nvPicPr>
-        <p:blipFill>
-          <a:blip r:embed="rId2"/>
-          <a:stretch>
-            <a:fillRect/>
-          </a:stretch>
-        </p:blipFill>
-        <p:spPr>
-          <a:xfrm>
-            <a:off x="838200" y="2392372"/>
-            <a:ext cx="8862965" cy="1600084"/>
-          </a:xfrm>
-          <a:prstGeom prst="rect">
-            <a:avLst/>
-          </a:prstGeom>
-        </p:spPr>
-      </p:pic>
-    </p:spTree>
-    <p:extLst>
-      <p:ext uri="{BB962C8B-B14F-4D97-AF65-F5344CB8AC3E}">
-        <p14:creationId xmlns:p14="http://schemas.microsoft.com/office/powerpoint/2010/main" val="4177234419"/>
       </p:ext>
     </p:extLst>
   </p:cSld>

</xml_diff>